<commit_message>
document clean up, formatting
</commit_message>
<xml_diff>
--- a/FinalLibraryFrameworkDesignDocument.pptx
+++ b/FinalLibraryFrameworkDesignDocument.pptx
@@ -211,7 +211,7 @@
           <a:p>
             <a:fld id="{207A4D14-C0C7-4076-8C0D-16D5C8CA2C99}" type="datetimeFigureOut">
               <a:rPr lang="en-US" smtClean="0"/>
-              <a:t>8/11/2019</a:t>
+              <a:t>8/12/2019</a:t>
             </a:fld>
             <a:endParaRPr lang="en-US"/>
           </a:p>
@@ -880,7 +880,7 @@
           <a:p>
             <a:fld id="{40B06E3B-156D-40F8-94F7-F2E625950314}" type="datetimeFigureOut">
               <a:rPr lang="en-US" smtClean="0"/>
-              <a:t>8/11/2019</a:t>
+              <a:t>8/12/2019</a:t>
             </a:fld>
             <a:endParaRPr lang="en-US"/>
           </a:p>
@@ -1078,7 +1078,7 @@
           <a:p>
             <a:fld id="{40B06E3B-156D-40F8-94F7-F2E625950314}" type="datetimeFigureOut">
               <a:rPr lang="en-US" smtClean="0"/>
-              <a:t>8/11/2019</a:t>
+              <a:t>8/12/2019</a:t>
             </a:fld>
             <a:endParaRPr lang="en-US"/>
           </a:p>
@@ -1286,7 +1286,7 @@
           <a:p>
             <a:fld id="{40B06E3B-156D-40F8-94F7-F2E625950314}" type="datetimeFigureOut">
               <a:rPr lang="en-US" smtClean="0"/>
-              <a:t>8/11/2019</a:t>
+              <a:t>8/12/2019</a:t>
             </a:fld>
             <a:endParaRPr lang="en-US"/>
           </a:p>
@@ -1484,7 +1484,7 @@
           <a:p>
             <a:fld id="{40B06E3B-156D-40F8-94F7-F2E625950314}" type="datetimeFigureOut">
               <a:rPr lang="en-US" smtClean="0"/>
-              <a:t>8/11/2019</a:t>
+              <a:t>8/12/2019</a:t>
             </a:fld>
             <a:endParaRPr lang="en-US"/>
           </a:p>
@@ -1759,7 +1759,7 @@
           <a:p>
             <a:fld id="{40B06E3B-156D-40F8-94F7-F2E625950314}" type="datetimeFigureOut">
               <a:rPr lang="en-US" smtClean="0"/>
-              <a:t>8/11/2019</a:t>
+              <a:t>8/12/2019</a:t>
             </a:fld>
             <a:endParaRPr lang="en-US"/>
           </a:p>
@@ -2024,7 +2024,7 @@
           <a:p>
             <a:fld id="{40B06E3B-156D-40F8-94F7-F2E625950314}" type="datetimeFigureOut">
               <a:rPr lang="en-US" smtClean="0"/>
-              <a:t>8/11/2019</a:t>
+              <a:t>8/12/2019</a:t>
             </a:fld>
             <a:endParaRPr lang="en-US"/>
           </a:p>
@@ -2436,7 +2436,7 @@
           <a:p>
             <a:fld id="{40B06E3B-156D-40F8-94F7-F2E625950314}" type="datetimeFigureOut">
               <a:rPr lang="en-US" smtClean="0"/>
-              <a:t>8/11/2019</a:t>
+              <a:t>8/12/2019</a:t>
             </a:fld>
             <a:endParaRPr lang="en-US"/>
           </a:p>
@@ -2577,7 +2577,7 @@
           <a:p>
             <a:fld id="{40B06E3B-156D-40F8-94F7-F2E625950314}" type="datetimeFigureOut">
               <a:rPr lang="en-US" smtClean="0"/>
-              <a:t>8/11/2019</a:t>
+              <a:t>8/12/2019</a:t>
             </a:fld>
             <a:endParaRPr lang="en-US"/>
           </a:p>
@@ -2690,7 +2690,7 @@
           <a:p>
             <a:fld id="{40B06E3B-156D-40F8-94F7-F2E625950314}" type="datetimeFigureOut">
               <a:rPr lang="en-US" smtClean="0"/>
-              <a:t>8/11/2019</a:t>
+              <a:t>8/12/2019</a:t>
             </a:fld>
             <a:endParaRPr lang="en-US"/>
           </a:p>
@@ -3001,7 +3001,7 @@
           <a:p>
             <a:fld id="{40B06E3B-156D-40F8-94F7-F2E625950314}" type="datetimeFigureOut">
               <a:rPr lang="en-US" smtClean="0"/>
-              <a:t>8/11/2019</a:t>
+              <a:t>8/12/2019</a:t>
             </a:fld>
             <a:endParaRPr lang="en-US"/>
           </a:p>
@@ -3289,7 +3289,7 @@
           <a:p>
             <a:fld id="{40B06E3B-156D-40F8-94F7-F2E625950314}" type="datetimeFigureOut">
               <a:rPr lang="en-US" smtClean="0"/>
-              <a:t>8/11/2019</a:t>
+              <a:t>8/12/2019</a:t>
             </a:fld>
             <a:endParaRPr lang="en-US"/>
           </a:p>
@@ -3530,7 +3530,7 @@
           <a:p>
             <a:fld id="{40B06E3B-156D-40F8-94F7-F2E625950314}" type="datetimeFigureOut">
               <a:rPr lang="en-US" smtClean="0"/>
-              <a:t>8/11/2019</a:t>
+              <a:t>8/12/2019</a:t>
             </a:fld>
             <a:endParaRPr lang="en-US"/>
           </a:p>
@@ -4446,55 +4446,117 @@
           <a:lstStyle/>
           <a:p>
             <a:r>
-              <a:rPr lang="en-US" sz="2000"/>
-              <a:t>Emmanuel Cadet (</a:t>
-            </a:r>
-            <a:r>
-              <a:rPr lang="en-US" sz="2000">
+              <a:rPr lang="en-US" sz="2000" dirty="0"/>
+              <a:t>Emmanuel Cadet</a:t>
+            </a:r>
+            <a:br>
+              <a:rPr lang="en-US" sz="2000" dirty="0"/>
+            </a:br>
+            <a:r>
+              <a:rPr lang="en-US" sz="2000" dirty="0"/>
+              <a:t>610163</a:t>
+            </a:r>
+            <a:br>
+              <a:rPr lang="en-US" sz="2000" dirty="0"/>
+            </a:br>
+            <a:r>
+              <a:rPr lang="en-US" sz="2000" dirty="0">
                 <a:hlinkClick r:id="rId3"/>
               </a:rPr>
               <a:t>ecades@mum.edu</a:t>
             </a:r>
-            <a:r>
-              <a:rPr lang="en-US" sz="2000"/>
-              <a:t>)</a:t>
-            </a:r>
-          </a:p>
-          <a:p>
-            <a:r>
-              <a:rPr lang="en-US" sz="2000"/>
-              <a:t>Musiliu Adeniyi Bolaji (</a:t>
-            </a:r>
-            <a:r>
-              <a:rPr lang="en-US" sz="2000">
+            <a:endParaRPr lang="en-US" sz="2000" dirty="0"/>
+          </a:p>
+          <a:p>
+            <a:r>
+              <a:rPr lang="en-US" sz="2000" dirty="0"/>
+              <a:t>Musiliu Adeniyi Bolaji</a:t>
+            </a:r>
+            <a:br>
+              <a:rPr lang="en-US" sz="2000" dirty="0"/>
+            </a:br>
+            <a:r>
+              <a:rPr lang="en-US" sz="2000" dirty="0"/>
+              <a:t>610130 </a:t>
+            </a:r>
+            <a:br>
+              <a:rPr lang="en-US" sz="2000" dirty="0"/>
+            </a:br>
+            <a:r>
+              <a:rPr lang="en-US" sz="2000" dirty="0">
                 <a:hlinkClick r:id="rId4"/>
               </a:rPr>
               <a:t>mabolaji@mum.edu</a:t>
             </a:r>
-            <a:r>
-              <a:rPr lang="en-US" sz="2000"/>
-              <a:t>)</a:t>
-            </a:r>
-          </a:p>
-          <a:p>
-            <a:r>
-              <a:rPr lang="en-US" sz="2000"/>
-              <a:t>Aaron Gezai (</a:t>
-            </a:r>
-            <a:r>
-              <a:rPr lang="en-US" sz="2000">
+            <a:endParaRPr lang="en-US" sz="2000" dirty="0"/>
+          </a:p>
+          <a:p>
+            <a:r>
+              <a:rPr lang="en-US" sz="2000" dirty="0"/>
+              <a:t>Aaron Gezai </a:t>
+            </a:r>
+            <a:br>
+              <a:rPr lang="en-US" sz="2000" dirty="0"/>
+            </a:br>
+            <a:r>
+              <a:rPr lang="en-US" sz="2000" dirty="0"/>
+              <a:t>109660</a:t>
+            </a:r>
+            <a:br>
+              <a:rPr lang="en-US" sz="2000" dirty="0"/>
+            </a:br>
+            <a:r>
+              <a:rPr lang="en-US" sz="2000" dirty="0">
                 <a:hlinkClick r:id="rId5"/>
               </a:rPr>
               <a:t>agezai@mum.edu</a:t>
             </a:r>
-            <a:r>
-              <a:rPr lang="en-US" sz="2000"/>
-              <a:t>)</a:t>
-            </a:r>
-          </a:p>
-          <a:p>
-            <a:pPr marL="0"/>
-            <a:endParaRPr lang="en-US" sz="2000"/>
+            <a:endParaRPr lang="en-US" sz="2000" dirty="0"/>
+          </a:p>
+        </p:txBody>
+      </p:sp>
+      <p:sp>
+        <p:nvSpPr>
+          <p:cNvPr id="3" name="TextBox 2">
+            <a:extLst>
+              <a:ext uri="{FF2B5EF4-FFF2-40B4-BE49-F238E27FC236}">
+                <a16:creationId xmlns:a16="http://schemas.microsoft.com/office/drawing/2014/main" id="{D14B98FA-24B0-4BFF-AA31-159EA14B0C4D}"/>
+              </a:ext>
+            </a:extLst>
+          </p:cNvPr>
+          <p:cNvSpPr txBox="1"/>
+          <p:nvPr/>
+        </p:nvSpPr>
+        <p:spPr>
+          <a:xfrm>
+            <a:off x="783771" y="352542"/>
+            <a:ext cx="6107417" cy="646331"/>
+          </a:xfrm>
+          <a:prstGeom prst="rect">
+            <a:avLst/>
+          </a:prstGeom>
+          <a:noFill/>
+        </p:spPr>
+        <p:txBody>
+          <a:bodyPr wrap="square" rtlCol="0">
+            <a:spAutoFit/>
+          </a:bodyPr>
+          <a:lstStyle/>
+          <a:p>
+            <a:pPr algn="ctr"/>
+            <a:r>
+              <a:rPr lang="en-US" sz="3600" b="1" dirty="0">
+                <a:solidFill>
+                  <a:schemeClr val="accent5">
+                    <a:lumMod val="75000"/>
+                  </a:schemeClr>
+                </a:solidFill>
+                <a:latin typeface="Times New Roman" panose="02020603050405020304" pitchFamily="18" charset="0"/>
+                <a:cs typeface="Times New Roman" panose="02020603050405020304" pitchFamily="18" charset="0"/>
+              </a:rPr>
+              <a:t>LIBRARY FRAMEWORK</a:t>
+            </a:r>
+            <a:endParaRPr lang="en-US" sz="3600" dirty="0"/>
           </a:p>
         </p:txBody>
       </p:sp>
@@ -4663,13 +4725,12 @@
           <a:lstStyle/>
           <a:p>
             <a:r>
-              <a:rPr lang="en-US" sz="3200" kern="1200">
+              <a:rPr lang="en-US" sz="3200" kern="1200" dirty="0">
                 <a:solidFill>
                   <a:srgbClr val="FFFFFF"/>
                 </a:solidFill>
-                <a:latin typeface="+mj-lt"/>
-                <a:ea typeface="+mj-ea"/>
-                <a:cs typeface="+mj-cs"/>
+                <a:latin typeface="Times New Roman" panose="02020603050405020304" pitchFamily="18" charset="0"/>
+                <a:cs typeface="Times New Roman" panose="02020603050405020304" pitchFamily="18" charset="0"/>
               </a:rPr>
               <a:t>The Factory Design Pattern</a:t>
             </a:r>
@@ -4709,7 +4770,35 @@
                 <a:latin typeface="Times New Roman" panose="02020603050405020304" pitchFamily="18" charset="0"/>
                 <a:cs typeface="Times New Roman" panose="02020603050405020304" pitchFamily="18" charset="0"/>
               </a:rPr>
-              <a:t>We use Factory pattern to create a data access object which may vary dependently on the type of service the BaseRepository interface need to store or get. The subclass RDBDataAccessFactory will decide which Data Access to create base on the type of the object that need to be stored. This solution is both reusable and easy to maintain. </a:t>
+              <a:t>We use Factory pattern to create a data access object which may vary dependently on the type of service the </a:t>
+            </a:r>
+            <a:r>
+              <a:rPr lang="en-US" sz="1800" b="1" dirty="0">
+                <a:latin typeface="Times New Roman" panose="02020603050405020304" pitchFamily="18" charset="0"/>
+                <a:cs typeface="Times New Roman" panose="02020603050405020304" pitchFamily="18" charset="0"/>
+              </a:rPr>
+              <a:t>BaseRepository</a:t>
+            </a:r>
+            <a:r>
+              <a:rPr lang="en-US" sz="1800" dirty="0">
+                <a:latin typeface="Times New Roman" panose="02020603050405020304" pitchFamily="18" charset="0"/>
+                <a:cs typeface="Times New Roman" panose="02020603050405020304" pitchFamily="18" charset="0"/>
+              </a:rPr>
+              <a:t> interface need to store or get. The subclass </a:t>
+            </a:r>
+            <a:r>
+              <a:rPr lang="en-US" sz="1800" b="1" dirty="0">
+                <a:latin typeface="Times New Roman" panose="02020603050405020304" pitchFamily="18" charset="0"/>
+                <a:cs typeface="Times New Roman" panose="02020603050405020304" pitchFamily="18" charset="0"/>
+              </a:rPr>
+              <a:t>RDBDataAccessFactory</a:t>
+            </a:r>
+            <a:r>
+              <a:rPr lang="en-US" sz="1800" dirty="0">
+                <a:latin typeface="Times New Roman" panose="02020603050405020304" pitchFamily="18" charset="0"/>
+                <a:cs typeface="Times New Roman" panose="02020603050405020304" pitchFamily="18" charset="0"/>
+              </a:rPr>
+              <a:t> will decide which Data Access to create base on the type of the object that need to be stored. This solution is both reusable and easy to maintain. </a:t>
             </a:r>
           </a:p>
         </p:txBody>
@@ -4915,13 +5004,12 @@
           <a:p>
             <a:pPr algn="ctr"/>
             <a:r>
-              <a:rPr lang="en-US" sz="2600" kern="1200">
+              <a:rPr lang="en-US" sz="2600" kern="1200" dirty="0">
                 <a:solidFill>
                   <a:srgbClr val="FFFFFF"/>
                 </a:solidFill>
-                <a:latin typeface="+mj-lt"/>
-                <a:ea typeface="+mj-ea"/>
-                <a:cs typeface="+mj-cs"/>
+                <a:latin typeface="Times New Roman" panose="02020603050405020304" pitchFamily="18" charset="0"/>
+                <a:cs typeface="Times New Roman" panose="02020603050405020304" pitchFamily="18" charset="0"/>
               </a:rPr>
               <a:t>The Command Design pattern.</a:t>
             </a:r>
@@ -5071,7 +5159,13 @@
           <a:lstStyle/>
           <a:p>
             <a:r>
-              <a:rPr lang="en-US"/>
+              <a:rPr lang="en-US" dirty="0">
+                <a:solidFill>
+                  <a:schemeClr val="tx2"/>
+                </a:solidFill>
+                <a:latin typeface="Times New Roman" panose="02020603050405020304" pitchFamily="18" charset="0"/>
+                <a:cs typeface="Times New Roman" panose="02020603050405020304" pitchFamily="18" charset="0"/>
+              </a:rPr>
               <a:t>The Adapter Design Pattern </a:t>
             </a:r>
           </a:p>
@@ -5322,27 +5416,33 @@
           </a:bodyPr>
           <a:lstStyle/>
           <a:p>
-            <a:pPr algn="r"/>
-            <a:r>
-              <a:rPr lang="en-US" dirty="0">
+            <a:pPr algn="ctr"/>
+            <a:r>
+              <a:rPr lang="en-US" sz="4800" dirty="0">
                 <a:solidFill>
                   <a:srgbClr val="FFFFFF"/>
                 </a:solidFill>
+                <a:latin typeface="Times New Roman" panose="02020603050405020304" pitchFamily="18" charset="0"/>
+                <a:cs typeface="Times New Roman" panose="02020603050405020304" pitchFamily="18" charset="0"/>
               </a:rPr>
               <a:t>The Façade Design </a:t>
             </a:r>
             <a:br>
-              <a:rPr lang="en-US" dirty="0">
+              <a:rPr lang="en-US" sz="4800" dirty="0">
                 <a:solidFill>
                   <a:srgbClr val="FFFFFF"/>
                 </a:solidFill>
+                <a:latin typeface="Times New Roman" panose="02020603050405020304" pitchFamily="18" charset="0"/>
+                <a:cs typeface="Times New Roman" panose="02020603050405020304" pitchFamily="18" charset="0"/>
               </a:rPr>
             </a:br>
             <a:r>
-              <a:rPr lang="en-US" dirty="0">
+              <a:rPr lang="en-US" sz="4800" dirty="0">
                 <a:solidFill>
                   <a:srgbClr val="FFFFFF"/>
                 </a:solidFill>
+                <a:latin typeface="Times New Roman" panose="02020603050405020304" pitchFamily="18" charset="0"/>
+                <a:cs typeface="Times New Roman" panose="02020603050405020304" pitchFamily="18" charset="0"/>
               </a:rPr>
               <a:t>Pattern </a:t>
             </a:r>
@@ -5569,7 +5669,7 @@
         <p:spPr>
           <a:xfrm>
             <a:off x="648929" y="629266"/>
-            <a:ext cx="6586491" cy="1676603"/>
+            <a:ext cx="6586491" cy="1440343"/>
           </a:xfrm>
         </p:spPr>
         <p:txBody>
@@ -5581,10 +5681,10 @@
             <a:r>
               <a:rPr lang="en-US" sz="3200" dirty="0">
                 <a:solidFill>
-                  <a:srgbClr val="FF0000"/>
+                  <a:schemeClr val="tx2"/>
                 </a:solidFill>
-                <a:latin typeface="Algerian" panose="04020705040A02060702" pitchFamily="82" charset="0"/>
-                <a:cs typeface="Aldhabi" panose="020B0604020202020204" pitchFamily="2" charset="-78"/>
+                <a:latin typeface="Times New Roman" panose="02020603050405020304" pitchFamily="18" charset="0"/>
+                <a:cs typeface="Times New Roman" panose="02020603050405020304" pitchFamily="18" charset="0"/>
               </a:rPr>
               <a:t>Singleton Design pattern </a:t>
             </a:r>
@@ -5615,7 +5715,7 @@
         </p:spPr>
         <p:txBody>
           <a:bodyPr vert="horz" lIns="91440" tIns="45720" rIns="91440" bIns="45720" rtlCol="0">
-            <a:normAutofit fontScale="92500" lnSpcReduction="10000"/>
+            <a:normAutofit fontScale="92500" lnSpcReduction="20000"/>
           </a:bodyPr>
           <a:lstStyle/>
           <a:p>
@@ -5624,7 +5724,7 @@
               <a:t>We use the singleton patter in the </a:t>
             </a:r>
             <a:r>
-              <a:rPr lang="en-US" dirty="0" err="1"/>
+              <a:rPr lang="en-US" b="1" dirty="0" err="1"/>
               <a:t>JDBCFace</a:t>
             </a:r>
             <a:r>
@@ -5638,12 +5738,12 @@
               <a:t>In this solution, the singleton instance is created inside an inner class and the inner class will be loaded only when the first call of the </a:t>
             </a:r>
             <a:r>
-              <a:rPr lang="en-US" dirty="0" err="1"/>
+              <a:rPr lang="en-US" b="1" dirty="0" err="1"/>
               <a:t>getInstance</a:t>
             </a:r>
             <a:r>
               <a:rPr lang="en-US" dirty="0"/>
-              <a:t> is made. This guaranty that the instance will be created when needed and as it is a private static instance which is initialized when it was declared it also guaranty thread safety. </a:t>
+              <a:t> is made. This guaranty that the instance will be created when needed and as it is a private static instance which is initialized when it was declared it also guaranty thread safety. Also used in two other places.</a:t>
             </a:r>
             <a:endParaRPr lang="en-US" sz="2400" dirty="0"/>
           </a:p>
@@ -5918,66 +6018,24 @@
       </p:grpSpPr>
       <p:sp>
         <p:nvSpPr>
-          <p:cNvPr id="2" name="Title 1">
-            <a:extLst>
-              <a:ext uri="{FF2B5EF4-FFF2-40B4-BE49-F238E27FC236}">
-                <a16:creationId xmlns:a16="http://schemas.microsoft.com/office/drawing/2014/main" id="{267B64F2-1009-4957-9F90-0709BB30E108}"/>
-              </a:ext>
-            </a:extLst>
-          </p:cNvPr>
-          <p:cNvSpPr>
-            <a:spLocks noGrp="1"/>
-          </p:cNvSpPr>
-          <p:nvPr>
-            <p:ph type="title"/>
+          <p:cNvPr id="3" name="Content Placeholder 2">
+            <a:extLst>
+              <a:ext uri="{FF2B5EF4-FFF2-40B4-BE49-F238E27FC236}">
+                <a16:creationId xmlns:a16="http://schemas.microsoft.com/office/drawing/2014/main" id="{2C546652-D560-4A2F-9813-A8C7FA6BF272}"/>
+              </a:ext>
+            </a:extLst>
+          </p:cNvPr>
+          <p:cNvSpPr>
+            <a:spLocks noGrp="1"/>
+          </p:cNvSpPr>
+          <p:nvPr>
+            <p:ph sz="half" idx="1"/>
           </p:nvPr>
         </p:nvSpPr>
         <p:spPr>
           <a:xfrm>
-            <a:off x="648929" y="629266"/>
-            <a:ext cx="4995126" cy="1676603"/>
-          </a:xfrm>
-        </p:spPr>
-        <p:txBody>
-          <a:bodyPr vert="horz" lIns="91440" tIns="45720" rIns="91440" bIns="45720" rtlCol="0" anchor="ctr">
-            <a:noAutofit/>
-          </a:bodyPr>
-          <a:lstStyle/>
-          <a:p>
-            <a:r>
-              <a:rPr lang="en-US" sz="2400" dirty="0">
-                <a:solidFill>
-                  <a:schemeClr val="accent5">
-                    <a:lumMod val="75000"/>
-                  </a:schemeClr>
-                </a:solidFill>
-                <a:latin typeface="Algerian" panose="04020705040A02060702" pitchFamily="82" charset="0"/>
-              </a:rPr>
-              <a:t> Library Framework</a:t>
-            </a:r>
-          </a:p>
-        </p:txBody>
-      </p:sp>
-      <p:sp>
-        <p:nvSpPr>
-          <p:cNvPr id="3" name="Content Placeholder 2">
-            <a:extLst>
-              <a:ext uri="{FF2B5EF4-FFF2-40B4-BE49-F238E27FC236}">
-                <a16:creationId xmlns:a16="http://schemas.microsoft.com/office/drawing/2014/main" id="{2C546652-D560-4A2F-9813-A8C7FA6BF272}"/>
-              </a:ext>
-            </a:extLst>
-          </p:cNvPr>
-          <p:cNvSpPr>
-            <a:spLocks noGrp="1"/>
-          </p:cNvSpPr>
-          <p:nvPr>
-            <p:ph sz="half" idx="1"/>
-          </p:nvPr>
-        </p:nvSpPr>
-        <p:spPr>
-          <a:xfrm>
-            <a:off x="648931" y="2286843"/>
-            <a:ext cx="3651466" cy="4381710"/>
+            <a:off x="648931" y="1068779"/>
+            <a:ext cx="3651466" cy="5599774"/>
           </a:xfrm>
         </p:spPr>
         <p:txBody>
@@ -5986,7 +6044,7 @@
           </a:bodyPr>
           <a:lstStyle/>
           <a:p>
-            <a:pPr marL="0" indent="0">
+            <a:pPr marL="0" indent="0" algn="just">
               <a:buNone/>
             </a:pPr>
             <a:r>
@@ -5998,6 +6056,7 @@
             </a:r>
           </a:p>
           <a:p>
+            <a:pPr algn="just"/>
             <a:r>
               <a:rPr lang="en-US" sz="2000" dirty="0">
                 <a:latin typeface="Times New Roman" panose="02020603050405020304" pitchFamily="18" charset="0"/>
@@ -6021,6 +6080,7 @@
             </a:r>
           </a:p>
           <a:p>
+            <a:pPr algn="just"/>
             <a:r>
               <a:rPr lang="en-US" sz="2000" dirty="0">
                 <a:latin typeface="Times New Roman" panose="02020603050405020304" pitchFamily="18" charset="0"/>
@@ -6144,9 +6204,10 @@
             <a:r>
               <a:rPr lang="en-US" sz="3600" dirty="0">
                 <a:solidFill>
-                  <a:srgbClr val="FF0000"/>
+                  <a:schemeClr val="accent1"/>
                 </a:solidFill>
-                <a:latin typeface="Algerian" panose="04020705040A02060702" pitchFamily="82" charset="0"/>
+                <a:latin typeface="Times New Roman" panose="02020603050405020304" pitchFamily="18" charset="0"/>
+                <a:cs typeface="Times New Roman" panose="02020603050405020304" pitchFamily="18" charset="0"/>
               </a:rPr>
               <a:t>LIBRARY FRAMEWORK</a:t>
             </a:r>
@@ -6183,9 +6244,6 @@
           <a:p>
             <a:r>
               <a:rPr lang="en-US" dirty="0">
-                <a:solidFill>
-                  <a:srgbClr val="00B0F0"/>
-                </a:solidFill>
                 <a:latin typeface="Times New Roman" panose="02020603050405020304" pitchFamily="18" charset="0"/>
                 <a:cs typeface="Times New Roman" panose="02020603050405020304" pitchFamily="18" charset="0"/>
               </a:rPr>
@@ -6195,9 +6253,6 @@
           <a:p>
             <a:r>
               <a:rPr lang="en-US" dirty="0">
-                <a:solidFill>
-                  <a:srgbClr val="00B0F0"/>
-                </a:solidFill>
                 <a:latin typeface="Times New Roman" panose="02020603050405020304" pitchFamily="18" charset="0"/>
                 <a:cs typeface="Times New Roman" panose="02020603050405020304" pitchFamily="18" charset="0"/>
               </a:rPr>
@@ -6208,9 +6263,6 @@
             <a:pPr lvl="1"/>
             <a:r>
               <a:rPr lang="en-US" dirty="0">
-                <a:solidFill>
-                  <a:srgbClr val="00B0F0"/>
-                </a:solidFill>
                 <a:latin typeface="Times New Roman" panose="02020603050405020304" pitchFamily="18" charset="0"/>
                 <a:cs typeface="Times New Roman" panose="02020603050405020304" pitchFamily="18" charset="0"/>
               </a:rPr>
@@ -6221,9 +6273,6 @@
             <a:pPr lvl="1"/>
             <a:r>
               <a:rPr lang="en-US" dirty="0">
-                <a:solidFill>
-                  <a:srgbClr val="00B0F0"/>
-                </a:solidFill>
                 <a:latin typeface="Times New Roman" panose="02020603050405020304" pitchFamily="18" charset="0"/>
                 <a:cs typeface="Times New Roman" panose="02020603050405020304" pitchFamily="18" charset="0"/>
               </a:rPr>
@@ -6234,9 +6283,6 @@
             <a:pPr lvl="1"/>
             <a:r>
               <a:rPr lang="en-US" dirty="0">
-                <a:solidFill>
-                  <a:srgbClr val="00B0F0"/>
-                </a:solidFill>
                 <a:latin typeface="Times New Roman" panose="02020603050405020304" pitchFamily="18" charset="0"/>
                 <a:cs typeface="Times New Roman" panose="02020603050405020304" pitchFamily="18" charset="0"/>
               </a:rPr>
@@ -6247,9 +6293,6 @@
             <a:pPr lvl="1"/>
             <a:r>
               <a:rPr lang="en-US" dirty="0">
-                <a:solidFill>
-                  <a:srgbClr val="00B0F0"/>
-                </a:solidFill>
                 <a:latin typeface="Times New Roman" panose="02020603050405020304" pitchFamily="18" charset="0"/>
                 <a:cs typeface="Times New Roman" panose="02020603050405020304" pitchFamily="18" charset="0"/>
               </a:rPr>
@@ -6259,32 +6302,31 @@
           <a:p>
             <a:r>
               <a:rPr lang="en-US" dirty="0">
-                <a:solidFill>
-                  <a:srgbClr val="00B0F0"/>
-                </a:solidFill>
                 <a:latin typeface="Times New Roman" panose="02020603050405020304" pitchFamily="18" charset="0"/>
                 <a:cs typeface="Times New Roman" panose="02020603050405020304" pitchFamily="18" charset="0"/>
               </a:rPr>
-              <a:t>The developer can specify which and where to save records : Flat File or Relational Database</a:t>
-            </a:r>
+              <a:t>The developer can specify which and where to save records : Flat File or Relational Database using </a:t>
+            </a:r>
+            <a:r>
+              <a:rPr lang="en-US" b="1" dirty="0" err="1"/>
+              <a:t>LibraryManager</a:t>
+            </a:r>
+            <a:endParaRPr lang="en-US" dirty="0">
+              <a:latin typeface="Times New Roman" panose="02020603050405020304" pitchFamily="18" charset="0"/>
+              <a:cs typeface="Times New Roman" panose="02020603050405020304" pitchFamily="18" charset="0"/>
+            </a:endParaRPr>
           </a:p>
           <a:p>
             <a:pPr marL="0" indent="0">
               <a:buNone/>
             </a:pPr>
             <a:endParaRPr lang="en-US" dirty="0">
-              <a:solidFill>
-                <a:srgbClr val="00B0F0"/>
-              </a:solidFill>
               <a:latin typeface="Times New Roman" panose="02020603050405020304" pitchFamily="18" charset="0"/>
               <a:cs typeface="Times New Roman" panose="02020603050405020304" pitchFamily="18" charset="0"/>
             </a:endParaRPr>
           </a:p>
           <a:p>
             <a:endParaRPr lang="en-US" dirty="0">
-              <a:solidFill>
-                <a:srgbClr val="00B0F0"/>
-              </a:solidFill>
               <a:latin typeface="Times New Roman" panose="02020603050405020304" pitchFamily="18" charset="0"/>
               <a:cs typeface="Times New Roman" panose="02020603050405020304" pitchFamily="18" charset="0"/>
             </a:endParaRPr>
@@ -6535,9 +6577,8 @@
                 <a:solidFill>
                   <a:srgbClr val="FFFFFF"/>
                 </a:solidFill>
-                <a:latin typeface="+mj-lt"/>
-                <a:ea typeface="+mj-ea"/>
-                <a:cs typeface="+mj-cs"/>
+                <a:latin typeface="Times New Roman" panose="02020603050405020304" pitchFamily="18" charset="0"/>
+                <a:cs typeface="Times New Roman" panose="02020603050405020304" pitchFamily="18" charset="0"/>
               </a:rPr>
               <a:t>Library Management System Use Case Diagram</a:t>
             </a:r>
@@ -6866,6 +6907,8 @@
                 <a:solidFill>
                   <a:srgbClr val="FFFFFF"/>
                 </a:solidFill>
+                <a:latin typeface="Times New Roman" panose="02020603050405020304" pitchFamily="18" charset="0"/>
+                <a:cs typeface="Times New Roman" panose="02020603050405020304" pitchFamily="18" charset="0"/>
               </a:rPr>
               <a:t>Library Framework Class Diagram</a:t>
             </a:r>
@@ -7003,15 +7046,16 @@
           </a:bodyPr>
           <a:lstStyle/>
           <a:p>
-            <a:pPr algn="r"/>
+            <a:pPr algn="ctr"/>
             <a:r>
               <a:rPr lang="en-US" dirty="0">
                 <a:solidFill>
                   <a:schemeClr val="accent1"/>
                 </a:solidFill>
-                <a:latin typeface="Algerian" panose="04020705040A02060702" pitchFamily="82" charset="0"/>
+                <a:latin typeface="Times New Roman" panose="02020603050405020304" pitchFamily="18" charset="0"/>
+                <a:cs typeface="Times New Roman" panose="02020603050405020304" pitchFamily="18" charset="0"/>
               </a:rPr>
-              <a:t>Patterns USED</a:t>
+              <a:t>PATTERNS USED</a:t>
             </a:r>
           </a:p>
         </p:txBody>
@@ -7360,13 +7404,12 @@
           <a:lstStyle/>
           <a:p>
             <a:r>
-              <a:rPr lang="en-US" kern="1200">
+              <a:rPr lang="en-US" kern="1200" dirty="0">
                 <a:solidFill>
                   <a:srgbClr val="FFFFFF"/>
                 </a:solidFill>
-                <a:latin typeface="+mj-lt"/>
-                <a:ea typeface="+mj-ea"/>
-                <a:cs typeface="+mj-cs"/>
+                <a:latin typeface="Times New Roman" panose="02020603050405020304" pitchFamily="18" charset="0"/>
+                <a:cs typeface="Times New Roman" panose="02020603050405020304" pitchFamily="18" charset="0"/>
               </a:rPr>
               <a:t>The Strategy Design Pattern </a:t>
             </a:r>
@@ -7529,9 +7572,10 @@
             <a:r>
               <a:rPr lang="en-US" sz="2800" dirty="0">
                 <a:solidFill>
-                  <a:srgbClr val="FF0000"/>
+                  <a:schemeClr val="tx2"/>
                 </a:solidFill>
-                <a:latin typeface="Algerian" panose="04020705040A02060702" pitchFamily="82" charset="0"/>
+                <a:latin typeface="Times New Roman" panose="02020603050405020304" pitchFamily="18" charset="0"/>
+                <a:cs typeface="Times New Roman" panose="02020603050405020304" pitchFamily="18" charset="0"/>
               </a:rPr>
               <a:t>Template Method Design Pattern</a:t>
             </a:r>
@@ -7566,6 +7610,7 @@
           </a:bodyPr>
           <a:lstStyle/>
           <a:p>
+            <a:pPr algn="just"/>
             <a:r>
               <a:rPr lang="en-US" dirty="0"/>
               <a:t>We use the load template method to offer the client the possibility to load his personal data by implementing the abstract methods in </a:t>

</xml_diff>

<commit_message>
Adding AuthorSaveCommand in command pattern
</commit_message>
<xml_diff>
--- a/FinalLibraryFrameworkDesignDocument.pptx
+++ b/FinalLibraryFrameworkDesignDocument.pptx
@@ -7745,10 +7745,10 @@
       </p:grpSpPr>
       <p:pic>
         <p:nvPicPr>
-          <p:cNvPr id="2" name="Picture 1">
-            <a:extLst>
-              <a:ext uri="{FF2B5EF4-FFF2-40B4-BE49-F238E27FC236}">
-                <a16:creationId xmlns:a16="http://schemas.microsoft.com/office/drawing/2014/main" id="{472179FC-10E2-4EC2-ABD2-38AF7A30B62B}"/>
+          <p:cNvPr id="3" name="Picture 2">
+            <a:extLst>
+              <a:ext uri="{FF2B5EF4-FFF2-40B4-BE49-F238E27FC236}">
+                <a16:creationId xmlns:a16="http://schemas.microsoft.com/office/drawing/2014/main" id="{951D67D9-7B3F-4C38-A5B5-DE3C0715D08A}"/>
               </a:ext>
             </a:extLst>
           </p:cNvPr>
@@ -7765,8 +7765,8 @@
         </p:blipFill>
         <p:spPr>
           <a:xfrm>
-            <a:off x="714376" y="0"/>
-            <a:ext cx="10672683" cy="6858000"/>
+            <a:off x="580972" y="-65675"/>
+            <a:ext cx="11611028" cy="7001980"/>
           </a:xfrm>
           <a:prstGeom prst="rect">
             <a:avLst/>
@@ -7775,10 +7775,10 @@
       </p:pic>
       <p:sp>
         <p:nvSpPr>
-          <p:cNvPr id="5" name="Title 1">
-            <a:extLst>
-              <a:ext uri="{FF2B5EF4-FFF2-40B4-BE49-F238E27FC236}">
-                <a16:creationId xmlns:a16="http://schemas.microsoft.com/office/drawing/2014/main" id="{8DDA5875-6A2A-4662-AD1C-4046C3E1625D}"/>
+          <p:cNvPr id="6" name="Title 1">
+            <a:extLst>
+              <a:ext uri="{FF2B5EF4-FFF2-40B4-BE49-F238E27FC236}">
+                <a16:creationId xmlns:a16="http://schemas.microsoft.com/office/drawing/2014/main" id="{D1E9277C-E622-4262-9804-28C149BD15CC}"/>
               </a:ext>
             </a:extLst>
           </p:cNvPr>
@@ -7789,7 +7789,7 @@
         </p:nvSpPr>
         <p:spPr>
           <a:xfrm>
-            <a:off x="8677337" y="2296648"/>
+            <a:off x="9288620" y="2205713"/>
             <a:ext cx="2800287" cy="2709275"/>
           </a:xfrm>
           <a:prstGeom prst="ellipse">

</xml_diff>